<commit_message>
updated js and layout
</commit_message>
<xml_diff>
--- a/Forecasting.pptx
+++ b/Forecasting.pptx
@@ -112,6 +112,11 @@
       </a:defRPr>
     </a:lvl9pPr>
   </p:defaultTextStyle>
+  <p:extLst>
+    <p:ext uri="{EFAFB233-063F-42B5-8137-9DF3F51BA10A}">
+      <p15:sldGuideLst xmlns:p15="http://schemas.microsoft.com/office/powerpoint/2012/main"/>
+    </p:ext>
+  </p:extLst>
 </p:presentation>
 </file>
 
@@ -3710,7 +3715,12 @@
             <p:ph type="title"/>
           </p:nvPr>
         </p:nvSpPr>
-        <p:spPr/>
+        <p:spPr>
+          <a:xfrm>
+            <a:off x="838200" y="365125"/>
+            <a:ext cx="10515600" cy="834501"/>
+          </a:xfrm>
+        </p:spPr>
         <p:txBody>
           <a:bodyPr/>
           <a:lstStyle/>
@@ -3746,6 +3756,36 @@
             <a:r>
               <a:rPr lang="en-MY" dirty="0"/>
               <a:t>Introduction and problem statement</a:t>
+            </a:r>
+          </a:p>
+          <a:p>
+            <a:r>
+              <a:rPr lang="en-MY" dirty="0"/>
+              <a:t>Question</a:t>
+            </a:r>
+          </a:p>
+          <a:p>
+            <a:r>
+              <a:rPr lang="en-MY" dirty="0"/>
+              <a:t>Data source</a:t>
+            </a:r>
+          </a:p>
+          <a:p>
+            <a:r>
+              <a:rPr lang="en-MY" dirty="0"/>
+              <a:t>Data preparation</a:t>
+            </a:r>
+          </a:p>
+          <a:p>
+            <a:r>
+              <a:rPr lang="en-MY" dirty="0"/>
+              <a:t>Data cleaning</a:t>
+            </a:r>
+          </a:p>
+          <a:p>
+            <a:r>
+              <a:rPr lang="en-MY" dirty="0"/>
+              <a:t>Tools we used</a:t>
             </a:r>
           </a:p>
           <a:p>

</xml_diff>